<commit_message>
update formprint and update web and update form set
</commit_message>
<xml_diff>
--- a/file/EnvelopePrint.pptx
+++ b/file/EnvelopePrint.pptx
@@ -5,7 +5,7 @@
     <p:sldMasterId id="2147483648" r:id="rId1"/>
   </p:sldMasterIdLst>
   <p:notesMasterIdLst>
-    <p:notesMasterId r:id="rId12"/>
+    <p:notesMasterId r:id="rId13"/>
   </p:notesMasterIdLst>
   <p:sldIdLst>
     <p:sldId id="256" r:id="rId2"/>
@@ -17,7 +17,8 @@
     <p:sldId id="279" r:id="rId8"/>
     <p:sldId id="280" r:id="rId9"/>
     <p:sldId id="282" r:id="rId10"/>
-    <p:sldId id="274" r:id="rId11"/>
+    <p:sldId id="284" r:id="rId11"/>
+    <p:sldId id="274" r:id="rId12"/>
   </p:sldIdLst>
   <p:sldSz cx="12192000" cy="6858000"/>
   <p:notesSz cx="6858000" cy="9144000"/>
@@ -206,7 +207,7 @@
           <a:p>
             <a:fld id="{A5A74288-C947-4756-8BD9-EA7F82D540BD}" type="datetimeFigureOut">
               <a:rPr lang="zh-TW" altLang="en-US" smtClean="0"/>
-              <a:t>2020-09-10</a:t>
+              <a:t>2020-11-08</a:t>
             </a:fld>
             <a:endParaRPr lang="zh-TW" altLang="en-US"/>
           </a:p>
@@ -605,7 +606,7 @@
           <a:p>
             <a:fld id="{0CAE62CD-8B21-4DCA-976C-72560D68D0CA}" type="datetime1">
               <a:rPr lang="zh-TW" altLang="en-US" smtClean="0"/>
-              <a:t>2020-09-10</a:t>
+              <a:t>2020-11-08</a:t>
             </a:fld>
             <a:endParaRPr lang="zh-TW" altLang="en-US"/>
           </a:p>
@@ -775,7 +776,7 @@
           <a:p>
             <a:fld id="{FD5CD77E-FA70-40ED-938B-98FBE1E917C8}" type="datetime1">
               <a:rPr lang="zh-TW" altLang="en-US" smtClean="0"/>
-              <a:t>2020-09-10</a:t>
+              <a:t>2020-11-08</a:t>
             </a:fld>
             <a:endParaRPr lang="zh-TW" altLang="en-US"/>
           </a:p>
@@ -955,7 +956,7 @@
           <a:p>
             <a:fld id="{5286E110-3EE8-4B8C-853C-B203B3244C6D}" type="datetime1">
               <a:rPr lang="zh-TW" altLang="en-US" smtClean="0"/>
-              <a:t>2020-09-10</a:t>
+              <a:t>2020-11-08</a:t>
             </a:fld>
             <a:endParaRPr lang="zh-TW" altLang="en-US"/>
           </a:p>
@@ -1125,7 +1126,7 @@
           <a:p>
             <a:fld id="{33B7AE41-A05E-49BD-9B51-43B9BEE09F68}" type="datetime1">
               <a:rPr lang="zh-TW" altLang="en-US" smtClean="0"/>
-              <a:t>2020-09-10</a:t>
+              <a:t>2020-11-08</a:t>
             </a:fld>
             <a:endParaRPr lang="zh-TW" altLang="en-US"/>
           </a:p>
@@ -1378,7 +1379,7 @@
           <a:p>
             <a:fld id="{910E07B1-B1DB-41D4-A293-DD0451BFCD2E}" type="datetime1">
               <a:rPr lang="zh-TW" altLang="en-US" smtClean="0"/>
-              <a:t>2020-09-10</a:t>
+              <a:t>2020-11-08</a:t>
             </a:fld>
             <a:endParaRPr lang="zh-TW" altLang="en-US"/>
           </a:p>
@@ -1610,7 +1611,7 @@
           <a:p>
             <a:fld id="{9D2A294F-6296-4261-8659-5CF0977F2C8B}" type="datetime1">
               <a:rPr lang="zh-TW" altLang="en-US" smtClean="0"/>
-              <a:t>2020-09-10</a:t>
+              <a:t>2020-11-08</a:t>
             </a:fld>
             <a:endParaRPr lang="zh-TW" altLang="en-US"/>
           </a:p>
@@ -1977,7 +1978,7 @@
           <a:p>
             <a:fld id="{5C34E62E-C413-4E58-B904-DFA0F38ADF3E}" type="datetime1">
               <a:rPr lang="zh-TW" altLang="en-US" smtClean="0"/>
-              <a:t>2020-09-10</a:t>
+              <a:t>2020-11-08</a:t>
             </a:fld>
             <a:endParaRPr lang="zh-TW" altLang="en-US"/>
           </a:p>
@@ -2095,7 +2096,7 @@
           <a:p>
             <a:fld id="{10E1CE0E-7F83-4E6F-930D-B806258325C8}" type="datetime1">
               <a:rPr lang="zh-TW" altLang="en-US" smtClean="0"/>
-              <a:t>2020-09-10</a:t>
+              <a:t>2020-11-08</a:t>
             </a:fld>
             <a:endParaRPr lang="zh-TW" altLang="en-US"/>
           </a:p>
@@ -2190,7 +2191,7 @@
           <a:p>
             <a:fld id="{71EC49EA-79D2-40AE-BC5E-6155B76F832C}" type="datetime1">
               <a:rPr lang="zh-TW" altLang="en-US" smtClean="0"/>
-              <a:t>2020-09-10</a:t>
+              <a:t>2020-11-08</a:t>
             </a:fld>
             <a:endParaRPr lang="zh-TW" altLang="en-US"/>
           </a:p>
@@ -2467,7 +2468,7 @@
           <a:p>
             <a:fld id="{AE263821-3DD8-4824-84F2-D2440375AD1A}" type="datetime1">
               <a:rPr lang="zh-TW" altLang="en-US" smtClean="0"/>
-              <a:t>2020-09-10</a:t>
+              <a:t>2020-11-08</a:t>
             </a:fld>
             <a:endParaRPr lang="zh-TW" altLang="en-US"/>
           </a:p>
@@ -2720,7 +2721,7 @@
           <a:p>
             <a:fld id="{D5DD94D9-7E21-48A6-9A87-BA0AF01DECA7}" type="datetime1">
               <a:rPr lang="zh-TW" altLang="en-US" smtClean="0"/>
-              <a:t>2020-09-10</a:t>
+              <a:t>2020-11-08</a:t>
             </a:fld>
             <a:endParaRPr lang="zh-TW" altLang="en-US"/>
           </a:p>
@@ -2933,7 +2934,7 @@
           <a:p>
             <a:fld id="{D3FA4732-7B13-4B13-9F29-AF1B1144B337}" type="datetime1">
               <a:rPr lang="zh-TW" altLang="en-US" smtClean="0"/>
-              <a:t>2020-09-10</a:t>
+              <a:t>2020-11-08</a:t>
             </a:fld>
             <a:endParaRPr lang="zh-TW" altLang="en-US"/>
           </a:p>
@@ -3424,6 +3425,201 @@
       </p:grpSpPr>
       <p:sp>
         <p:nvSpPr>
+          <p:cNvPr id="4" name="標題 1"/>
+          <p:cNvSpPr txBox="1">
+            <a:spLocks/>
+          </p:cNvSpPr>
+          <p:nvPr/>
+        </p:nvSpPr>
+        <p:spPr>
+          <a:xfrm>
+            <a:off x="838200" y="365125"/>
+            <a:ext cx="5771147" cy="844489"/>
+          </a:xfrm>
+          <a:prstGeom prst="rect">
+            <a:avLst/>
+          </a:prstGeom>
+          <a:solidFill>
+            <a:schemeClr val="accent6">
+              <a:lumMod val="20000"/>
+              <a:lumOff val="80000"/>
+            </a:schemeClr>
+          </a:solidFill>
+        </p:spPr>
+        <p:txBody>
+          <a:bodyPr vert="horz" lIns="91440" tIns="45720" rIns="91440" bIns="45720" rtlCol="0" anchor="ctr">
+            <a:normAutofit/>
+          </a:bodyPr>
+          <a:lstStyle>
+            <a:lvl1pPr algn="l" defTabSz="914400" rtl="0" eaLnBrk="1" latinLnBrk="0" hangingPunct="1">
+              <a:lnSpc>
+                <a:spcPct val="90000"/>
+              </a:lnSpc>
+              <a:spcBef>
+                <a:spcPct val="0"/>
+              </a:spcBef>
+              <a:buNone/>
+              <a:defRPr sz="4400" kern="1200">
+                <a:solidFill>
+                  <a:schemeClr val="tx1"/>
+                </a:solidFill>
+                <a:latin typeface="+mj-lt"/>
+                <a:ea typeface="+mj-ea"/>
+                <a:cs typeface="+mj-cs"/>
+              </a:defRPr>
+            </a:lvl1pPr>
+          </a:lstStyle>
+          <a:p>
+            <a:pPr algn="ctr"/>
+            <a:r>
+              <a:rPr lang="zh-TW" altLang="en-US" sz="3600" dirty="0" smtClean="0"/>
+              <a:t>最終套印結果</a:t>
+            </a:r>
+            <a:endParaRPr lang="zh-TW" altLang="en-US" sz="3600" dirty="0"/>
+          </a:p>
+        </p:txBody>
+      </p:sp>
+      <p:sp>
+        <p:nvSpPr>
+          <p:cNvPr id="2" name="投影片編號版面配置區 1"/>
+          <p:cNvSpPr>
+            <a:spLocks noGrp="1"/>
+          </p:cNvSpPr>
+          <p:nvPr>
+            <p:ph type="sldNum" sz="quarter" idx="12"/>
+          </p:nvPr>
+        </p:nvSpPr>
+        <p:spPr/>
+        <p:txBody>
+          <a:bodyPr/>
+          <a:lstStyle/>
+          <a:p>
+            <a:fld id="{E6B6EF07-459A-4CB9-B1F3-0734876A23B5}" type="slidenum">
+              <a:rPr lang="zh-TW" altLang="en-US" smtClean="0"/>
+              <a:t>10</a:t>
+            </a:fld>
+            <a:endParaRPr lang="zh-TW" altLang="en-US"/>
+          </a:p>
+        </p:txBody>
+      </p:sp>
+      <p:pic>
+        <p:nvPicPr>
+          <p:cNvPr id="6" name="圖片 5"/>
+          <p:cNvPicPr>
+            <a:picLocks noChangeAspect="1"/>
+          </p:cNvPicPr>
+          <p:nvPr/>
+        </p:nvPicPr>
+        <p:blipFill>
+          <a:blip r:embed="rId2"/>
+          <a:stretch>
+            <a:fillRect/>
+          </a:stretch>
+        </p:blipFill>
+        <p:spPr>
+          <a:xfrm>
+            <a:off x="7115153" y="365125"/>
+            <a:ext cx="3757384" cy="6356350"/>
+          </a:xfrm>
+          <a:prstGeom prst="rect">
+            <a:avLst/>
+          </a:prstGeom>
+        </p:spPr>
+      </p:pic>
+      <p:sp>
+        <p:nvSpPr>
+          <p:cNvPr id="7" name="內容版面配置區 2"/>
+          <p:cNvSpPr>
+            <a:spLocks noGrp="1"/>
+          </p:cNvSpPr>
+          <p:nvPr>
+            <p:ph idx="1"/>
+          </p:nvPr>
+        </p:nvSpPr>
+        <p:spPr>
+          <a:xfrm>
+            <a:off x="838200" y="1495424"/>
+            <a:ext cx="4808621" cy="4860925"/>
+          </a:xfrm>
+        </p:spPr>
+        <p:txBody>
+          <a:bodyPr>
+            <a:normAutofit/>
+          </a:bodyPr>
+          <a:lstStyle/>
+          <a:p>
+            <a:pPr>
+              <a:lnSpc>
+                <a:spcPct val="120000"/>
+              </a:lnSpc>
+            </a:pPr>
+            <a:r>
+              <a:rPr lang="zh-TW" altLang="en-US" sz="3200" dirty="0" smtClean="0"/>
+              <a:t>漂亮吧</a:t>
+            </a:r>
+            <a:r>
+              <a:rPr lang="en-US" altLang="zh-TW" sz="3200" dirty="0" smtClean="0"/>
+              <a:t>!</a:t>
+            </a:r>
+            <a:r>
+              <a:rPr lang="zh-TW" altLang="en-US" sz="3200" dirty="0" smtClean="0"/>
+              <a:t>您套印出來的結果有跟右圖一樣嗎</a:t>
+            </a:r>
+            <a:r>
+              <a:rPr lang="en-US" altLang="zh-TW" sz="3200" dirty="0" smtClean="0"/>
+              <a:t>?</a:t>
+            </a:r>
+            <a:endParaRPr lang="en-US" altLang="zh-TW" sz="2800" dirty="0" smtClean="0"/>
+          </a:p>
+          <a:p>
+            <a:pPr lvl="1">
+              <a:lnSpc>
+                <a:spcPct val="120000"/>
+              </a:lnSpc>
+            </a:pPr>
+            <a:endParaRPr lang="zh-TW" altLang="en-US" dirty="0"/>
+          </a:p>
+        </p:txBody>
+      </p:sp>
+    </p:spTree>
+    <p:extLst>
+      <p:ext uri="{BB962C8B-B14F-4D97-AF65-F5344CB8AC3E}">
+        <p14:creationId xmlns:p14="http://schemas.microsoft.com/office/powerpoint/2010/main" val="2376770591"/>
+      </p:ext>
+    </p:extLst>
+  </p:cSld>
+  <p:clrMapOvr>
+    <a:masterClrMapping/>
+  </p:clrMapOvr>
+  <p:timing>
+    <p:tnLst>
+      <p:par>
+        <p:cTn id="1" dur="indefinite" restart="never" nodeType="tmRoot"/>
+      </p:par>
+    </p:tnLst>
+  </p:timing>
+</p:sld>
+</file>
+
+<file path=ppt/slides/slide11.xml><?xml version="1.0" encoding="utf-8"?>
+<p:sld xmlns:a="http://schemas.openxmlformats.org/drawingml/2006/main" xmlns:r="http://schemas.openxmlformats.org/officeDocument/2006/relationships" xmlns:p="http://schemas.openxmlformats.org/presentationml/2006/main">
+  <p:cSld>
+    <p:spTree>
+      <p:nvGrpSpPr>
+        <p:cNvPr id="1" name=""/>
+        <p:cNvGrpSpPr/>
+        <p:nvPr/>
+      </p:nvGrpSpPr>
+      <p:grpSpPr>
+        <a:xfrm>
+          <a:off x="0" y="0"/>
+          <a:ext cx="0" cy="0"/>
+          <a:chOff x="0" y="0"/>
+          <a:chExt cx="0" cy="0"/>
+        </a:xfrm>
+      </p:grpSpPr>
+      <p:sp>
+        <p:nvSpPr>
           <p:cNvPr id="3" name="內容版面配置區 2"/>
           <p:cNvSpPr>
             <a:spLocks noGrp="1"/>
@@ -3699,7 +3895,7 @@
           <a:p>
             <a:fld id="{E6B6EF07-459A-4CB9-B1F3-0734876A23B5}" type="slidenum">
               <a:rPr lang="zh-TW" altLang="en-US" smtClean="0"/>
-              <a:t>10</a:t>
+              <a:t>11</a:t>
             </a:fld>
             <a:endParaRPr lang="zh-TW" altLang="en-US" dirty="0"/>
           </a:p>
@@ -5082,11 +5278,7 @@
             </a:pPr>
             <a:r>
               <a:rPr lang="zh-TW" altLang="en-US" sz="2800" dirty="0" smtClean="0"/>
-              <a:t>一般信封</a:t>
-            </a:r>
-            <a:r>
-              <a:rPr lang="zh-TW" altLang="en-US" sz="2800" dirty="0" smtClean="0"/>
-              <a:t>：不屬於前面的</a:t>
+              <a:t>一般信封：不屬於前面的</a:t>
             </a:r>
             <a:r>
               <a:rPr lang="en-US" altLang="zh-TW" sz="2800" dirty="0" smtClean="0"/>
@@ -5114,23 +5306,7 @@
             </a:pPr>
             <a:r>
               <a:rPr lang="zh-TW" altLang="en-US" sz="2800" dirty="0" smtClean="0"/>
-              <a:t>常見</a:t>
-            </a:r>
-            <a:r>
-              <a:rPr lang="zh-TW" altLang="en-US" sz="2800" dirty="0" smtClean="0"/>
-              <a:t>的白色信封，主要有橫式及直式，且有多種尺寸</a:t>
-            </a:r>
-            <a:r>
-              <a:rPr lang="zh-TW" altLang="en-US" sz="2800" dirty="0" smtClean="0"/>
-              <a:t>。製造</a:t>
-            </a:r>
-            <a:r>
-              <a:rPr lang="zh-TW" altLang="en-US" sz="2800" dirty="0" smtClean="0"/>
-              <a:t>的廠商</a:t>
-            </a:r>
-            <a:r>
-              <a:rPr lang="zh-TW" altLang="en-US" sz="2800" dirty="0" smtClean="0"/>
-              <a:t>不拘。</a:t>
+              <a:t>常見的白色信封，主要有橫式及直式，且有多種尺寸。製造的廠商不拘。</a:t>
             </a:r>
             <a:endParaRPr lang="en-US" altLang="zh-TW" sz="2800" dirty="0" smtClean="0"/>
           </a:p>
@@ -5142,11 +5318,7 @@
             </a:pPr>
             <a:r>
               <a:rPr lang="zh-TW" altLang="en-US" sz="2800" dirty="0" smtClean="0"/>
-              <a:t>表格</a:t>
-            </a:r>
-            <a:r>
-              <a:rPr lang="zh-TW" altLang="en-US" sz="2800" dirty="0" smtClean="0"/>
-              <a:t>代號為</a:t>
+              <a:t>表格代號為</a:t>
             </a:r>
             <a:r>
               <a:rPr lang="en-US" altLang="zh-TW" sz="2800" dirty="0" smtClean="0">
@@ -5877,6 +6049,64 @@
           </a:prstGeom>
         </p:spPr>
       </p:pic>
+      <p:sp>
+        <p:nvSpPr>
+          <p:cNvPr id="5" name="內容版面配置區 2"/>
+          <p:cNvSpPr>
+            <a:spLocks noGrp="1"/>
+          </p:cNvSpPr>
+          <p:nvPr>
+            <p:ph idx="1"/>
+          </p:nvPr>
+        </p:nvSpPr>
+        <p:spPr>
+          <a:xfrm>
+            <a:off x="838200" y="1495424"/>
+            <a:ext cx="4808621" cy="3367521"/>
+          </a:xfrm>
+        </p:spPr>
+        <p:txBody>
+          <a:bodyPr>
+            <a:normAutofit lnSpcReduction="10000"/>
+          </a:bodyPr>
+          <a:lstStyle/>
+          <a:p>
+            <a:pPr>
+              <a:lnSpc>
+                <a:spcPct val="120000"/>
+              </a:lnSpc>
+            </a:pPr>
+            <a:r>
+              <a:rPr lang="zh-TW" altLang="en-US" sz="3200" dirty="0" smtClean="0"/>
+              <a:t>巷、弄、號、樓、室的資料太多字，導致套印結果不夠漂亮：</a:t>
+            </a:r>
+            <a:endParaRPr lang="en-US" altLang="zh-TW" sz="3200" dirty="0" smtClean="0"/>
+          </a:p>
+          <a:p>
+            <a:pPr lvl="1">
+              <a:lnSpc>
+                <a:spcPct val="120000"/>
+              </a:lnSpc>
+            </a:pPr>
+            <a:r>
+              <a:rPr lang="zh-TW" altLang="en-US" sz="2800" dirty="0" smtClean="0"/>
+              <a:t>導至列印不目前是設定橫式列印有多個字，例如</a:t>
+            </a:r>
+            <a:r>
+              <a:rPr lang="en-US" altLang="zh-TW" sz="2800" dirty="0" smtClean="0"/>
+              <a:t>55-66</a:t>
+            </a:r>
+          </a:p>
+          <a:p>
+            <a:pPr lvl="1">
+              <a:lnSpc>
+                <a:spcPct val="120000"/>
+              </a:lnSpc>
+            </a:pPr>
+            <a:endParaRPr lang="zh-TW" altLang="en-US" dirty="0"/>
+          </a:p>
+        </p:txBody>
+      </p:sp>
     </p:spTree>
     <p:extLst>
       <p:ext uri="{BB962C8B-B14F-4D97-AF65-F5344CB8AC3E}">

</xml_diff>